<commit_message>
finish layout with colors
</commit_message>
<xml_diff>
--- a/0. Layout/Layouts.pptx
+++ b/0. Layout/Layouts.pptx
@@ -5,7 +5,7 @@
     <p:sldMasterId id="2147483648" r:id="rId1"/>
   </p:sldMasterIdLst>
   <p:notesMasterIdLst>
-    <p:notesMasterId r:id="rId8"/>
+    <p:notesMasterId r:id="rId11"/>
   </p:notesMasterIdLst>
   <p:sldIdLst>
     <p:sldId id="257" r:id="rId2"/>
@@ -13,7 +13,10 @@
     <p:sldId id="266" r:id="rId4"/>
     <p:sldId id="263" r:id="rId5"/>
     <p:sldId id="264" r:id="rId6"/>
-    <p:sldId id="265" r:id="rId7"/>
+    <p:sldId id="268" r:id="rId7"/>
+    <p:sldId id="269" r:id="rId8"/>
+    <p:sldId id="267" r:id="rId9"/>
+    <p:sldId id="265" r:id="rId10"/>
   </p:sldIdLst>
   <p:sldSz cx="12192000" cy="6858000"/>
   <p:notesSz cx="6858000" cy="9144000"/>
@@ -122,6 +125,9 @@
             <p14:sldId id="266"/>
             <p14:sldId id="263"/>
             <p14:sldId id="264"/>
+            <p14:sldId id="268"/>
+            <p14:sldId id="269"/>
+            <p14:sldId id="267"/>
             <p14:sldId id="265"/>
           </p14:sldIdLst>
         </p14:section>
@@ -227,7 +233,7 @@
           <a:p>
             <a:fld id="{0F406AFF-B15F-48C4-AB91-6DEDCEBD030A}" type="datetimeFigureOut">
               <a:rPr lang="pt-BR" smtClean="0"/>
-              <a:t>04/08/2025</a:t>
+              <a:t>05/08/2025</a:t>
             </a:fld>
             <a:endParaRPr lang="pt-BR"/>
           </a:p>
@@ -641,7 +647,7 @@
           <a:p>
             <a:fld id="{888315AA-2347-485D-B310-C5DDC136F8D7}" type="datetimeFigureOut">
               <a:rPr lang="pt-BR" smtClean="0"/>
-              <a:t>04/08/2025</a:t>
+              <a:t>05/08/2025</a:t>
             </a:fld>
             <a:endParaRPr lang="pt-BR"/>
           </a:p>
@@ -839,7 +845,7 @@
           <a:p>
             <a:fld id="{888315AA-2347-485D-B310-C5DDC136F8D7}" type="datetimeFigureOut">
               <a:rPr lang="pt-BR" smtClean="0"/>
-              <a:t>04/08/2025</a:t>
+              <a:t>05/08/2025</a:t>
             </a:fld>
             <a:endParaRPr lang="pt-BR"/>
           </a:p>
@@ -1047,7 +1053,7 @@
           <a:p>
             <a:fld id="{888315AA-2347-485D-B310-C5DDC136F8D7}" type="datetimeFigureOut">
               <a:rPr lang="pt-BR" smtClean="0"/>
-              <a:t>04/08/2025</a:t>
+              <a:t>05/08/2025</a:t>
             </a:fld>
             <a:endParaRPr lang="pt-BR"/>
           </a:p>
@@ -1245,7 +1251,7 @@
           <a:p>
             <a:fld id="{888315AA-2347-485D-B310-C5DDC136F8D7}" type="datetimeFigureOut">
               <a:rPr lang="pt-BR" smtClean="0"/>
-              <a:t>04/08/2025</a:t>
+              <a:t>05/08/2025</a:t>
             </a:fld>
             <a:endParaRPr lang="pt-BR"/>
           </a:p>
@@ -1520,7 +1526,7 @@
           <a:p>
             <a:fld id="{888315AA-2347-485D-B310-C5DDC136F8D7}" type="datetimeFigureOut">
               <a:rPr lang="pt-BR" smtClean="0"/>
-              <a:t>04/08/2025</a:t>
+              <a:t>05/08/2025</a:t>
             </a:fld>
             <a:endParaRPr lang="pt-BR"/>
           </a:p>
@@ -1785,7 +1791,7 @@
           <a:p>
             <a:fld id="{888315AA-2347-485D-B310-C5DDC136F8D7}" type="datetimeFigureOut">
               <a:rPr lang="pt-BR" smtClean="0"/>
-              <a:t>04/08/2025</a:t>
+              <a:t>05/08/2025</a:t>
             </a:fld>
             <a:endParaRPr lang="pt-BR"/>
           </a:p>
@@ -2197,7 +2203,7 @@
           <a:p>
             <a:fld id="{888315AA-2347-485D-B310-C5DDC136F8D7}" type="datetimeFigureOut">
               <a:rPr lang="pt-BR" smtClean="0"/>
-              <a:t>04/08/2025</a:t>
+              <a:t>05/08/2025</a:t>
             </a:fld>
             <a:endParaRPr lang="pt-BR"/>
           </a:p>
@@ -2338,7 +2344,7 @@
           <a:p>
             <a:fld id="{888315AA-2347-485D-B310-C5DDC136F8D7}" type="datetimeFigureOut">
               <a:rPr lang="pt-BR" smtClean="0"/>
-              <a:t>04/08/2025</a:t>
+              <a:t>05/08/2025</a:t>
             </a:fld>
             <a:endParaRPr lang="pt-BR"/>
           </a:p>
@@ -2451,7 +2457,7 @@
           <a:p>
             <a:fld id="{888315AA-2347-485D-B310-C5DDC136F8D7}" type="datetimeFigureOut">
               <a:rPr lang="pt-BR" smtClean="0"/>
-              <a:t>04/08/2025</a:t>
+              <a:t>05/08/2025</a:t>
             </a:fld>
             <a:endParaRPr lang="pt-BR"/>
           </a:p>
@@ -2762,7 +2768,7 @@
           <a:p>
             <a:fld id="{888315AA-2347-485D-B310-C5DDC136F8D7}" type="datetimeFigureOut">
               <a:rPr lang="pt-BR" smtClean="0"/>
-              <a:t>04/08/2025</a:t>
+              <a:t>05/08/2025</a:t>
             </a:fld>
             <a:endParaRPr lang="pt-BR"/>
           </a:p>
@@ -3050,7 +3056,7 @@
           <a:p>
             <a:fld id="{888315AA-2347-485D-B310-C5DDC136F8D7}" type="datetimeFigureOut">
               <a:rPr lang="pt-BR" smtClean="0"/>
-              <a:t>04/08/2025</a:t>
+              <a:t>05/08/2025</a:t>
             </a:fld>
             <a:endParaRPr lang="pt-BR"/>
           </a:p>
@@ -3291,7 +3297,7 @@
           <a:p>
             <a:fld id="{888315AA-2347-485D-B310-C5DDC136F8D7}" type="datetimeFigureOut">
               <a:rPr lang="pt-BR" smtClean="0"/>
-              <a:t>04/08/2025</a:t>
+              <a:t>05/08/2025</a:t>
             </a:fld>
             <a:endParaRPr lang="pt-BR"/>
           </a:p>
@@ -4147,6 +4153,300 @@
 </file>
 
 <file path=ppt/slides/slide6.xml><?xml version="1.0" encoding="utf-8"?>
+<p:sld xmlns:a="http://schemas.openxmlformats.org/drawingml/2006/main" xmlns:r="http://schemas.openxmlformats.org/officeDocument/2006/relationships" xmlns:p="http://schemas.openxmlformats.org/presentationml/2006/main">
+  <p:cSld>
+    <p:bg>
+      <p:bgPr>
+        <a:solidFill>
+          <a:srgbClr val="04232D">
+            <a:alpha val="3000"/>
+          </a:srgbClr>
+        </a:solidFill>
+        <a:effectLst/>
+      </p:bgPr>
+    </p:bg>
+    <p:spTree>
+      <p:nvGrpSpPr>
+        <p:cNvPr id="1" name="">
+          <a:extLst>
+            <a:ext uri="{FF2B5EF4-FFF2-40B4-BE49-F238E27FC236}">
+              <a16:creationId xmlns:a16="http://schemas.microsoft.com/office/drawing/2014/main" id="{6CFCC1FF-EF9F-6A6F-768F-7B207B7DAA18}"/>
+            </a:ext>
+          </a:extLst>
+        </p:cNvPr>
+        <p:cNvGrpSpPr/>
+        <p:nvPr/>
+      </p:nvGrpSpPr>
+      <p:grpSpPr>
+        <a:xfrm>
+          <a:off x="0" y="0"/>
+          <a:ext cx="0" cy="0"/>
+          <a:chOff x="0" y="0"/>
+          <a:chExt cx="0" cy="0"/>
+        </a:xfrm>
+      </p:grpSpPr>
+      <p:sp>
+        <p:nvSpPr>
+          <p:cNvPr id="4" name="Retângulo: Cantos Arredondados 3">
+            <a:extLst>
+              <a:ext uri="{FF2B5EF4-FFF2-40B4-BE49-F238E27FC236}">
+                <a16:creationId xmlns:a16="http://schemas.microsoft.com/office/drawing/2014/main" id="{97C65978-C7BD-E407-DAE9-08089B0E4F11}"/>
+              </a:ext>
+            </a:extLst>
+          </p:cNvPr>
+          <p:cNvSpPr/>
+          <p:nvPr/>
+        </p:nvSpPr>
+        <p:spPr>
+          <a:xfrm rot="16200000">
+            <a:off x="-2611799" y="3311165"/>
+            <a:ext cx="6138000" cy="235670"/>
+          </a:xfrm>
+          <a:prstGeom prst="roundRect">
+            <a:avLst/>
+          </a:prstGeom>
+          <a:solidFill>
+            <a:srgbClr val="118AB2">
+              <a:alpha val="80000"/>
+            </a:srgbClr>
+          </a:solidFill>
+          <a:ln w="0">
+            <a:solidFill>
+              <a:srgbClr val="118AB2"/>
+            </a:solidFill>
+          </a:ln>
+        </p:spPr>
+        <p:style>
+          <a:lnRef idx="2">
+            <a:schemeClr val="accent1">
+              <a:shade val="15000"/>
+            </a:schemeClr>
+          </a:lnRef>
+          <a:fillRef idx="1">
+            <a:schemeClr val="accent1"/>
+          </a:fillRef>
+          <a:effectRef idx="0">
+            <a:schemeClr val="accent1"/>
+          </a:effectRef>
+          <a:fontRef idx="minor">
+            <a:schemeClr val="lt1"/>
+          </a:fontRef>
+        </p:style>
+        <p:txBody>
+          <a:bodyPr rtlCol="0" anchor="ctr"/>
+          <a:lstStyle/>
+          <a:p>
+            <a:pPr algn="ctr"/>
+            <a:endParaRPr lang="pt-BR"/>
+          </a:p>
+        </p:txBody>
+      </p:sp>
+    </p:spTree>
+    <p:extLst>
+      <p:ext uri="{BB962C8B-B14F-4D97-AF65-F5344CB8AC3E}">
+        <p14:creationId xmlns:p14="http://schemas.microsoft.com/office/powerpoint/2010/main" val="1665848254"/>
+      </p:ext>
+    </p:extLst>
+  </p:cSld>
+  <p:clrMapOvr>
+    <a:masterClrMapping/>
+  </p:clrMapOvr>
+</p:sld>
+</file>
+
+<file path=ppt/slides/slide7.xml><?xml version="1.0" encoding="utf-8"?>
+<p:sld xmlns:a="http://schemas.openxmlformats.org/drawingml/2006/main" xmlns:r="http://schemas.openxmlformats.org/officeDocument/2006/relationships" xmlns:p="http://schemas.openxmlformats.org/presentationml/2006/main">
+  <p:cSld>
+    <p:bg>
+      <p:bgPr>
+        <a:solidFill>
+          <a:srgbClr val="04232D">
+            <a:alpha val="3000"/>
+          </a:srgbClr>
+        </a:solidFill>
+        <a:effectLst/>
+      </p:bgPr>
+    </p:bg>
+    <p:spTree>
+      <p:nvGrpSpPr>
+        <p:cNvPr id="1" name="">
+          <a:extLst>
+            <a:ext uri="{FF2B5EF4-FFF2-40B4-BE49-F238E27FC236}">
+              <a16:creationId xmlns:a16="http://schemas.microsoft.com/office/drawing/2014/main" id="{2C48D73C-3600-66E3-2712-9438E63B0963}"/>
+            </a:ext>
+          </a:extLst>
+        </p:cNvPr>
+        <p:cNvGrpSpPr/>
+        <p:nvPr/>
+      </p:nvGrpSpPr>
+      <p:grpSpPr>
+        <a:xfrm>
+          <a:off x="0" y="0"/>
+          <a:ext cx="0" cy="0"/>
+          <a:chOff x="0" y="0"/>
+          <a:chExt cx="0" cy="0"/>
+        </a:xfrm>
+      </p:grpSpPr>
+      <p:sp>
+        <p:nvSpPr>
+          <p:cNvPr id="4" name="Retângulo: Cantos Arredondados 3">
+            <a:extLst>
+              <a:ext uri="{FF2B5EF4-FFF2-40B4-BE49-F238E27FC236}">
+                <a16:creationId xmlns:a16="http://schemas.microsoft.com/office/drawing/2014/main" id="{0B37B8FF-E358-E27E-0702-03BD2A3768FF}"/>
+              </a:ext>
+            </a:extLst>
+          </p:cNvPr>
+          <p:cNvSpPr/>
+          <p:nvPr/>
+        </p:nvSpPr>
+        <p:spPr>
+          <a:xfrm rot="16200000">
+            <a:off x="-2717283" y="3264250"/>
+            <a:ext cx="6138000" cy="329500"/>
+          </a:xfrm>
+          <a:prstGeom prst="roundRect">
+            <a:avLst/>
+          </a:prstGeom>
+          <a:solidFill>
+            <a:srgbClr val="118AB2">
+              <a:alpha val="80000"/>
+            </a:srgbClr>
+          </a:solidFill>
+          <a:ln w="0">
+            <a:solidFill>
+              <a:srgbClr val="118AB2"/>
+            </a:solidFill>
+          </a:ln>
+        </p:spPr>
+        <p:style>
+          <a:lnRef idx="2">
+            <a:schemeClr val="accent1">
+              <a:shade val="15000"/>
+            </a:schemeClr>
+          </a:lnRef>
+          <a:fillRef idx="1">
+            <a:schemeClr val="accent1"/>
+          </a:fillRef>
+          <a:effectRef idx="0">
+            <a:schemeClr val="accent1"/>
+          </a:effectRef>
+          <a:fontRef idx="minor">
+            <a:schemeClr val="lt1"/>
+          </a:fontRef>
+        </p:style>
+        <p:txBody>
+          <a:bodyPr rtlCol="0" anchor="ctr"/>
+          <a:lstStyle/>
+          <a:p>
+            <a:pPr algn="ctr"/>
+            <a:endParaRPr lang="pt-BR"/>
+          </a:p>
+        </p:txBody>
+      </p:sp>
+    </p:spTree>
+    <p:extLst>
+      <p:ext uri="{BB962C8B-B14F-4D97-AF65-F5344CB8AC3E}">
+        <p14:creationId xmlns:p14="http://schemas.microsoft.com/office/powerpoint/2010/main" val="489433186"/>
+      </p:ext>
+    </p:extLst>
+  </p:cSld>
+  <p:clrMapOvr>
+    <a:masterClrMapping/>
+  </p:clrMapOvr>
+</p:sld>
+</file>
+
+<file path=ppt/slides/slide8.xml><?xml version="1.0" encoding="utf-8"?>
+<p:sld xmlns:a="http://schemas.openxmlformats.org/drawingml/2006/main" xmlns:r="http://schemas.openxmlformats.org/officeDocument/2006/relationships" xmlns:p="http://schemas.openxmlformats.org/presentationml/2006/main">
+  <p:cSld>
+    <p:bg>
+      <p:bgPr>
+        <a:solidFill>
+          <a:schemeClr val="bg1">
+            <a:alpha val="0"/>
+          </a:schemeClr>
+        </a:solidFill>
+        <a:effectLst/>
+      </p:bgPr>
+    </p:bg>
+    <p:spTree>
+      <p:nvGrpSpPr>
+        <p:cNvPr id="1" name="">
+          <a:extLst>
+            <a:ext uri="{FF2B5EF4-FFF2-40B4-BE49-F238E27FC236}">
+              <a16:creationId xmlns:a16="http://schemas.microsoft.com/office/drawing/2014/main" id="{1803812E-BF64-23C5-1F9E-9C472A745896}"/>
+            </a:ext>
+          </a:extLst>
+        </p:cNvPr>
+        <p:cNvGrpSpPr/>
+        <p:nvPr/>
+      </p:nvGrpSpPr>
+      <p:grpSpPr>
+        <a:xfrm>
+          <a:off x="0" y="0"/>
+          <a:ext cx="0" cy="0"/>
+          <a:chOff x="0" y="0"/>
+          <a:chExt cx="0" cy="0"/>
+        </a:xfrm>
+      </p:grpSpPr>
+      <p:cxnSp>
+        <p:nvCxnSpPr>
+          <p:cNvPr id="3" name="Conector reto 2">
+            <a:extLst>
+              <a:ext uri="{FF2B5EF4-FFF2-40B4-BE49-F238E27FC236}">
+                <a16:creationId xmlns:a16="http://schemas.microsoft.com/office/drawing/2014/main" id="{69917731-6DD0-CFD4-6A30-CF9CC76D6FE4}"/>
+              </a:ext>
+            </a:extLst>
+          </p:cNvPr>
+          <p:cNvCxnSpPr/>
+          <p:nvPr/>
+        </p:nvCxnSpPr>
+        <p:spPr>
+          <a:xfrm flipV="1">
+            <a:off x="540000" y="540000"/>
+            <a:ext cx="11109600" cy="0"/>
+          </a:xfrm>
+          <a:prstGeom prst="line">
+            <a:avLst/>
+          </a:prstGeom>
+          <a:ln>
+            <a:solidFill>
+              <a:schemeClr val="accent4">
+                <a:lumMod val="40000"/>
+                <a:lumOff val="60000"/>
+              </a:schemeClr>
+            </a:solidFill>
+          </a:ln>
+        </p:spPr>
+        <p:style>
+          <a:lnRef idx="1">
+            <a:schemeClr val="accent1"/>
+          </a:lnRef>
+          <a:fillRef idx="0">
+            <a:schemeClr val="accent1"/>
+          </a:fillRef>
+          <a:effectRef idx="0">
+            <a:schemeClr val="accent1"/>
+          </a:effectRef>
+          <a:fontRef idx="minor">
+            <a:schemeClr val="tx1"/>
+          </a:fontRef>
+        </p:style>
+      </p:cxnSp>
+    </p:spTree>
+    <p:extLst>
+      <p:ext uri="{BB962C8B-B14F-4D97-AF65-F5344CB8AC3E}">
+        <p14:creationId xmlns:p14="http://schemas.microsoft.com/office/powerpoint/2010/main" val="4019442947"/>
+      </p:ext>
+    </p:extLst>
+  </p:cSld>
+  <p:clrMapOvr>
+    <a:masterClrMapping/>
+  </p:clrMapOvr>
+</p:sld>
+</file>
+
+<file path=ppt/slides/slide9.xml><?xml version="1.0" encoding="utf-8"?>
 <p:sld xmlns:a="http://schemas.openxmlformats.org/drawingml/2006/main" xmlns:r="http://schemas.openxmlformats.org/officeDocument/2006/relationships" xmlns:p="http://schemas.openxmlformats.org/presentationml/2006/main">
   <p:cSld>
     <p:bg>

</xml_diff>